<commit_message>
final proposal final revised
</commit_message>
<xml_diff>
--- a/FinalProposal_106598047.pptx
+++ b/FinalProposal_106598047.pptx
@@ -5,14 +5,18 @@
     <p:sldMasterId id="2147483648" r:id="rId1"/>
   </p:sldMasterIdLst>
   <p:notesMasterIdLst>
-    <p:notesMasterId r:id="rId7"/>
+    <p:notesMasterId r:id="rId11"/>
   </p:notesMasterIdLst>
   <p:sldIdLst>
     <p:sldId id="256" r:id="rId2"/>
-    <p:sldId id="257" r:id="rId3"/>
-    <p:sldId id="258" r:id="rId4"/>
-    <p:sldId id="260" r:id="rId5"/>
-    <p:sldId id="261" r:id="rId6"/>
+    <p:sldId id="265" r:id="rId3"/>
+    <p:sldId id="257" r:id="rId4"/>
+    <p:sldId id="264" r:id="rId5"/>
+    <p:sldId id="258" r:id="rId6"/>
+    <p:sldId id="260" r:id="rId7"/>
+    <p:sldId id="263" r:id="rId8"/>
+    <p:sldId id="262" r:id="rId9"/>
+    <p:sldId id="261" r:id="rId10"/>
   </p:sldIdLst>
   <p:sldSz cx="10693400" cy="7562850"/>
   <p:notesSz cx="10693400" cy="7562850"/>
@@ -375,6 +379,11 @@
         </p:txBody>
       </p:sp>
     </p:spTree>
+    <p:extLst>
+      <p:ext uri="{BB962C8B-B14F-4D97-AF65-F5344CB8AC3E}">
+        <p14:creationId xmlns:p14="http://schemas.microsoft.com/office/powerpoint/2010/main" val="3951650009"/>
+      </p:ext>
+    </p:extLst>
   </p:cSld>
   <p:clrMap bg1="lt1" tx1="dk1" bg2="lt2" tx2="dk2" accent1="accent1" accent2="accent2" accent3="accent3" accent4="accent4" accent5="accent5" accent6="accent6" hlink="hlink" folHlink="folHlink"/>
   <p:notesStyle>
@@ -1935,13 +1944,7 @@
               <a:rPr lang="zh-TW" altLang="en-US" spc="5" dirty="0" smtClean="0">
                 <a:uFillTx/>
               </a:rPr>
-              <a:t>迷宮</a:t>
-            </a:r>
-            <a:r>
-              <a:rPr lang="zh-TW" altLang="en-US" spc="5" dirty="0" smtClean="0">
-                <a:uFillTx/>
-              </a:rPr>
-              <a:t>球</a:t>
+              <a:t>迷宮球</a:t>
             </a:r>
             <a:endParaRPr spc="5" dirty="0">
               <a:uFillTx/>
@@ -1982,11 +1985,7 @@
             </a:pPr>
             <a:r>
               <a:rPr lang="zh-TW" altLang="en-US" sz="2800" kern="0" spc="5" dirty="0" smtClean="0"/>
-              <a:t>第十</a:t>
-            </a:r>
-            <a:r>
-              <a:rPr lang="zh-TW" altLang="en-US" sz="2800" kern="0" spc="5" dirty="0" smtClean="0"/>
-              <a:t>組</a:t>
+              <a:t>第十組</a:t>
             </a:r>
             <a:endParaRPr lang="en-US" altLang="zh-TW" sz="2800" kern="0" spc="5" dirty="0" smtClean="0"/>
           </a:p>
@@ -2044,7 +2043,7 @@
 </file>
 
 <file path=ppt/slides/slide2.xml><?xml version="1.0" encoding="utf-8"?>
-<p:sld xmlns:a="http://schemas.openxmlformats.org/drawingml/2006/main" xmlns:r="http://schemas.openxmlformats.org/officeDocument/2006/relationships" xmlns:p="http://schemas.openxmlformats.org/presentationml/2006/main" showMasterSp="0">
+<p:sld xmlns:a="http://schemas.openxmlformats.org/drawingml/2006/main" xmlns:r="http://schemas.openxmlformats.org/officeDocument/2006/relationships" xmlns:p="http://schemas.openxmlformats.org/presentationml/2006/main">
   <p:cSld>
     <p:spTree>
       <p:nvGrpSpPr>
@@ -2062,7 +2061,7 @@
       </p:grpSpPr>
       <p:sp>
         <p:nvSpPr>
-          <p:cNvPr id="2" name="object 2"/>
+          <p:cNvPr id="4" name="object 2"/>
           <p:cNvSpPr txBox="1">
             <a:spLocks noGrp="1"/>
           </p:cNvSpPr>
@@ -2091,22 +2090,8 @@
               </a:lnSpc>
             </a:pPr>
             <a:r>
-              <a:rPr lang="en-US" altLang="zh-TW" sz="4000" spc="365" dirty="0" smtClean="0">
-                <a:uFillTx/>
-              </a:rPr>
-              <a:t>What </a:t>
-            </a:r>
-            <a:r>
-              <a:rPr lang="en-US" altLang="zh-TW" sz="4000" spc="365" dirty="0" smtClean="0">
-                <a:uFillTx/>
-              </a:rPr>
-              <a:t>am I doing</a:t>
-            </a:r>
-            <a:r>
-              <a:rPr sz="4000" spc="365" dirty="0" smtClean="0">
-                <a:uFillTx/>
-              </a:rPr>
-              <a:t>?!</a:t>
+              <a:rPr lang="zh-TW" altLang="en-US" sz="4000" dirty="0"/>
+              <a:t>開發動機</a:t>
             </a:r>
             <a:endParaRPr sz="4000" dirty="0">
               <a:uFillTx/>
@@ -2116,7 +2101,7 @@
       </p:sp>
       <p:sp>
         <p:nvSpPr>
-          <p:cNvPr id="3" name="object 3"/>
+          <p:cNvPr id="5" name="object 3"/>
           <p:cNvSpPr txBox="1">
             <a:spLocks noGrp="1"/>
           </p:cNvSpPr>
@@ -2127,7 +2112,7 @@
         <p:spPr>
           <a:xfrm>
             <a:off x="1040682" y="2108802"/>
-            <a:ext cx="8612035" cy="3503523"/>
+            <a:ext cx="8612035" cy="1028487"/>
           </a:xfrm>
           <a:prstGeom prst="rect">
             <a:avLst/>
@@ -2139,7 +2124,7 @@
           </a:bodyPr>
           <a:lstStyle/>
           <a:p>
-            <a:pPr marL="739140" indent="-182880">
+            <a:pPr marL="556260">
               <a:lnSpc>
                 <a:spcPct val="100000"/>
               </a:lnSpc>
@@ -2149,330 +2134,44 @@
               <a:buClr>
                 <a:srgbClr val="262626"/>
               </a:buClr>
-              <a:buChar char="◦"/>
             </a:pPr>
             <a:r>
-              <a:rPr lang="zh-TW" altLang="en-US" sz="2000" spc="145" dirty="0" smtClean="0">
-                <a:uFillTx/>
-              </a:rPr>
-              <a:t>我將要做</a:t>
-            </a:r>
-            <a:r>
-              <a:rPr lang="en-US" altLang="zh-TW" sz="2000" spc="145" dirty="0" smtClean="0">
-                <a:uFillTx/>
-              </a:rPr>
-              <a:t>”</a:t>
-            </a:r>
-            <a:r>
-              <a:rPr lang="zh-TW" altLang="en-US" sz="2000" spc="145" dirty="0" smtClean="0">
-                <a:uFillTx/>
-              </a:rPr>
-              <a:t>迷宮球</a:t>
-            </a:r>
-            <a:r>
-              <a:rPr lang="en-US" altLang="zh-TW" sz="2000" spc="145" dirty="0" smtClean="0">
-                <a:uFillTx/>
-              </a:rPr>
-              <a:t>” app</a:t>
-            </a:r>
-            <a:r>
-              <a:rPr sz="2000" spc="145" dirty="0" smtClean="0">
-                <a:uFillTx/>
-              </a:rPr>
-              <a:t>.</a:t>
-            </a:r>
-            <a:endParaRPr sz="2000" spc="145" dirty="0">
-              <a:uFillTx/>
-            </a:endParaRPr>
-          </a:p>
-          <a:p>
-            <a:pPr marL="739140" indent="-182880">
-              <a:lnSpc>
-                <a:spcPct val="100000"/>
-              </a:lnSpc>
-              <a:spcBef>
-                <a:spcPts val="720"/>
-              </a:spcBef>
-              <a:buClr>
-                <a:srgbClr val="262626"/>
-              </a:buClr>
-              <a:buChar char="◦"/>
-            </a:pPr>
-            <a:r>
-              <a:rPr lang="zh-TW" altLang="en-US" sz="2000" spc="125" dirty="0" smtClean="0">
-                <a:uFillTx/>
-              </a:rPr>
-              <a:t>以下是這個</a:t>
-            </a:r>
-            <a:r>
-              <a:rPr lang="en-US" altLang="zh-TW" sz="2000" spc="125" dirty="0" smtClean="0">
+              <a:rPr lang="zh-TW" altLang="en-US" sz="2000" spc="114" dirty="0" smtClean="0">
+                <a:uFillTx/>
+              </a:rPr>
+              <a:t>最近休閒時，發現迷宮球這款遊戲</a:t>
+            </a:r>
+            <a:r>
+              <a:rPr lang="en-US" altLang="zh-TW" sz="2000" spc="114" dirty="0" smtClean="0">
                 <a:uFillTx/>
               </a:rPr>
               <a:t>app</a:t>
             </a:r>
             <a:r>
-              <a:rPr lang="zh-TW" altLang="en-US" sz="2000" spc="125" dirty="0" smtClean="0">
-                <a:uFillTx/>
-              </a:rPr>
-              <a:t>的功能</a:t>
-            </a:r>
-            <a:r>
-              <a:rPr sz="2000" spc="125" dirty="0" smtClean="0">
-                <a:uFillTx/>
-              </a:rPr>
-              <a:t>:</a:t>
-            </a:r>
-            <a:endParaRPr sz="2000" spc="125" dirty="0">
-              <a:uFillTx/>
-            </a:endParaRPr>
-          </a:p>
-          <a:p>
-            <a:pPr marL="899160" lvl="1" indent="-342900">
-              <a:spcBef>
-                <a:spcPts val="720"/>
-              </a:spcBef>
-              <a:buClr>
-                <a:srgbClr val="262626"/>
-              </a:buClr>
-              <a:buFontTx/>
-              <a:buChar char="•"/>
-            </a:pPr>
-            <a:r>
-              <a:rPr lang="zh-TW" altLang="en-US" sz="2000" dirty="0" smtClean="0">
-                <a:uFillTx/>
-                <a:latin typeface="Times New Roman"/>
-                <a:cs typeface="Times New Roman"/>
-              </a:rPr>
-              <a:t>關卡進行中時，會顯示剩餘時間</a:t>
-            </a:r>
-            <a:endParaRPr lang="en-US" altLang="zh-TW" sz="2000" dirty="0" smtClean="0">
-              <a:uFillTx/>
-              <a:latin typeface="Times New Roman"/>
-              <a:cs typeface="Times New Roman"/>
-            </a:endParaRPr>
-          </a:p>
-          <a:p>
-            <a:pPr marL="899160" lvl="1" indent="-342900">
-              <a:spcBef>
-                <a:spcPts val="720"/>
-              </a:spcBef>
-              <a:buClr>
-                <a:srgbClr val="262626"/>
-              </a:buClr>
-              <a:buFontTx/>
-              <a:buChar char="•"/>
-            </a:pPr>
-            <a:r>
-              <a:rPr lang="zh-TW" altLang="en-US" sz="2000" dirty="0" smtClean="0">
-                <a:uFillTx/>
-                <a:latin typeface="Times New Roman"/>
-                <a:cs typeface="Times New Roman"/>
-              </a:rPr>
-              <a:t>觸碰螢幕，遊戲暫停，並顯示訊息，告知使用者繼續遊戲，或是重新開始。</a:t>
-            </a:r>
-            <a:endParaRPr lang="en-US" altLang="zh-TW" sz="2000" dirty="0" smtClean="0">
-              <a:uFillTx/>
-              <a:latin typeface="Times New Roman"/>
-              <a:cs typeface="Times New Roman"/>
-            </a:endParaRPr>
-          </a:p>
-          <a:p>
-            <a:pPr marL="899160" lvl="1" indent="-342900">
-              <a:spcBef>
-                <a:spcPts val="720"/>
-              </a:spcBef>
-              <a:buClr>
-                <a:srgbClr val="262626"/>
-              </a:buClr>
-              <a:buFontTx/>
-              <a:buChar char="•"/>
-            </a:pPr>
-            <a:r>
-              <a:rPr lang="zh-TW" altLang="en-US" sz="2000" spc="25" dirty="0" smtClean="0">
-                <a:uFillTx/>
-                <a:latin typeface="Times New Roman"/>
-                <a:cs typeface="Times New Roman"/>
-              </a:rPr>
-              <a:t>藉由轉動</a:t>
-            </a:r>
-            <a:r>
-              <a:rPr lang="en-US" altLang="zh-TW" sz="2000" spc="25" dirty="0" err="1" smtClean="0">
-                <a:uFillTx/>
-                <a:latin typeface="Times New Roman"/>
-                <a:cs typeface="Times New Roman"/>
-              </a:rPr>
+              <a:rPr lang="zh-TW" altLang="en-US" sz="2000" spc="114" dirty="0" smtClean="0"/>
+              <a:t>，</a:t>
+            </a:r>
+            <a:r>
+              <a:rPr lang="zh-TW" altLang="en-US" sz="2000" spc="114" dirty="0"/>
+              <a:t>玩家只需轉動</a:t>
+            </a:r>
+            <a:r>
+              <a:rPr lang="en-US" altLang="zh-TW" sz="2000" spc="114" dirty="0" err="1"/>
               <a:t>iphone</a:t>
             </a:r>
             <a:r>
-              <a:rPr lang="zh-TW" altLang="en-US" sz="2000" spc="25" dirty="0">
-                <a:uFillTx/>
-                <a:latin typeface="Times New Roman"/>
-                <a:cs typeface="Times New Roman"/>
-              </a:rPr>
-              <a:t>來讓球</a:t>
-            </a:r>
-            <a:r>
-              <a:rPr lang="zh-TW" altLang="en-US" sz="2000" spc="25" dirty="0" smtClean="0">
-                <a:uFillTx/>
-                <a:latin typeface="Times New Roman"/>
-                <a:cs typeface="Times New Roman"/>
-              </a:rPr>
-              <a:t>移動</a:t>
-            </a:r>
-            <a:endParaRPr lang="en-US" altLang="zh-TW" sz="2000" spc="25" dirty="0" smtClean="0">
-              <a:uFillTx/>
-              <a:latin typeface="Times New Roman"/>
-              <a:cs typeface="Times New Roman"/>
-            </a:endParaRPr>
-          </a:p>
-          <a:p>
-            <a:pPr marL="899160" lvl="1" indent="-342900">
-              <a:spcBef>
-                <a:spcPts val="720"/>
-              </a:spcBef>
-              <a:buClr>
-                <a:srgbClr val="262626"/>
-              </a:buClr>
-              <a:buFontTx/>
-              <a:buChar char="•"/>
-            </a:pPr>
-            <a:r>
-              <a:rPr lang="zh-TW" altLang="en-US" sz="2000" spc="25" dirty="0">
-                <a:uFillTx/>
-                <a:latin typeface="Times New Roman"/>
-                <a:cs typeface="Times New Roman"/>
-              </a:rPr>
-              <a:t>當</a:t>
-            </a:r>
-            <a:r>
-              <a:rPr lang="zh-TW" altLang="en-US" sz="2000" spc="25" dirty="0" smtClean="0">
-                <a:uFillTx/>
-                <a:latin typeface="Times New Roman"/>
-                <a:cs typeface="Times New Roman"/>
-              </a:rPr>
-              <a:t>球在時間內移動到終點，就過關，並顯示過關訊息</a:t>
-            </a:r>
-            <a:endParaRPr lang="en-US" altLang="zh-TW" sz="2000" spc="25" dirty="0" smtClean="0">
-              <a:uFillTx/>
-              <a:latin typeface="Times New Roman"/>
-              <a:cs typeface="Times New Roman"/>
-            </a:endParaRPr>
-          </a:p>
-          <a:p>
-            <a:pPr marL="899160" lvl="1" indent="-342900">
-              <a:spcBef>
-                <a:spcPts val="720"/>
-              </a:spcBef>
-              <a:buClr>
-                <a:srgbClr val="262626"/>
-              </a:buClr>
-              <a:buFontTx/>
-              <a:buChar char="•"/>
-            </a:pPr>
-            <a:r>
-              <a:rPr lang="zh-TW" altLang="en-US" sz="2000" spc="25" dirty="0">
-                <a:uFillTx/>
-                <a:latin typeface="Times New Roman"/>
-                <a:cs typeface="Times New Roman"/>
-              </a:rPr>
-              <a:t>當球在時間</a:t>
-            </a:r>
-            <a:r>
-              <a:rPr lang="zh-TW" altLang="en-US" sz="2000" spc="25" dirty="0" smtClean="0">
-                <a:uFillTx/>
-                <a:latin typeface="Times New Roman"/>
-                <a:cs typeface="Times New Roman"/>
-              </a:rPr>
-              <a:t>內尚未移動</a:t>
-            </a:r>
-            <a:r>
-              <a:rPr lang="zh-TW" altLang="en-US" sz="2000" spc="25" dirty="0" smtClean="0">
-                <a:latin typeface="Times New Roman"/>
-                <a:cs typeface="Times New Roman"/>
-              </a:rPr>
-              <a:t>到終點，</a:t>
-            </a:r>
-            <a:r>
-              <a:rPr lang="zh-TW" altLang="en-US" sz="2000" spc="25" dirty="0" smtClean="0">
-                <a:uFillTx/>
-                <a:latin typeface="Times New Roman"/>
-                <a:cs typeface="Times New Roman"/>
-              </a:rPr>
-              <a:t>就</a:t>
-            </a:r>
-            <a:r>
-              <a:rPr lang="zh-TW" altLang="en-US" sz="2000" spc="50" dirty="0">
-                <a:uFillTx/>
-              </a:rPr>
-              <a:t>失敗</a:t>
-            </a:r>
-            <a:r>
-              <a:rPr lang="zh-TW" altLang="en-US" sz="2000" spc="25" dirty="0" smtClean="0">
-                <a:uFillTx/>
-                <a:latin typeface="Times New Roman"/>
-                <a:cs typeface="Times New Roman"/>
-              </a:rPr>
-              <a:t>，</a:t>
-            </a:r>
-            <a:r>
-              <a:rPr lang="zh-TW" altLang="en-US" sz="2000" spc="25" dirty="0">
-                <a:uFillTx/>
-                <a:latin typeface="Times New Roman"/>
-                <a:cs typeface="Times New Roman"/>
-              </a:rPr>
-              <a:t>並</a:t>
-            </a:r>
-            <a:r>
-              <a:rPr lang="zh-TW" altLang="en-US" sz="2000" spc="25" dirty="0" smtClean="0">
-                <a:uFillTx/>
-                <a:latin typeface="Times New Roman"/>
-                <a:cs typeface="Times New Roman"/>
-              </a:rPr>
-              <a:t>顯示</a:t>
-            </a:r>
-            <a:r>
-              <a:rPr lang="zh-TW" altLang="en-US" sz="2000" spc="50" dirty="0" smtClean="0">
-                <a:uFillTx/>
-              </a:rPr>
-              <a:t>失敗</a:t>
-            </a:r>
-            <a:r>
-              <a:rPr lang="zh-TW" altLang="en-US" sz="2000" spc="25" dirty="0" smtClean="0">
-                <a:latin typeface="Times New Roman"/>
-                <a:cs typeface="Times New Roman"/>
-              </a:rPr>
-              <a:t>訊息</a:t>
-            </a:r>
-            <a:endParaRPr sz="2000" dirty="0">
-              <a:uFillTx/>
-              <a:latin typeface="Times New Roman"/>
-              <a:cs typeface="Times New Roman"/>
-            </a:endParaRPr>
-          </a:p>
-          <a:p>
-            <a:pPr marL="899160" indent="-342900">
-              <a:lnSpc>
-                <a:spcPct val="100000"/>
-              </a:lnSpc>
-              <a:spcBef>
-                <a:spcPts val="715"/>
-              </a:spcBef>
-              <a:buClr>
-                <a:srgbClr val="262626"/>
-              </a:buClr>
-              <a:buChar char="•"/>
-            </a:pPr>
-            <a:r>
-              <a:rPr lang="en-US" sz="2000" spc="140" dirty="0" smtClean="0">
-                <a:uFillTx/>
-              </a:rPr>
-              <a:t>iPhone </a:t>
-            </a:r>
-            <a:r>
-              <a:rPr sz="2000" spc="75" dirty="0" smtClean="0">
-                <a:uFillTx/>
-              </a:rPr>
-              <a:t>only.</a:t>
+              <a:rPr lang="zh-TW" altLang="en-US" sz="2000" spc="114" dirty="0"/>
+              <a:t>便可操作</a:t>
+            </a:r>
+            <a:r>
+              <a:rPr lang="zh-TW" altLang="en-US" sz="2000" spc="114" dirty="0" smtClean="0"/>
+              <a:t>遊戲</a:t>
+            </a:r>
+            <a:r>
+              <a:rPr lang="zh-TW" altLang="en-US" sz="2000" spc="114" dirty="0" smtClean="0">
+                <a:uFillTx/>
+              </a:rPr>
+              <a:t>，無須複雜的操作方式，便可讓人於忙碌之餘，有個可以稍微放鬆時刻。</a:t>
             </a:r>
             <a:endParaRPr sz="2000" spc="114" dirty="0">
               <a:uFillTx/>
@@ -2481,6 +2180,11 @@
         </p:txBody>
       </p:sp>
     </p:spTree>
+    <p:extLst>
+      <p:ext uri="{BB962C8B-B14F-4D97-AF65-F5344CB8AC3E}">
+        <p14:creationId xmlns:p14="http://schemas.microsoft.com/office/powerpoint/2010/main" val="2557224488"/>
+      </p:ext>
+    </p:extLst>
   </p:cSld>
   <p:clrMapOvr>
     <a:masterClrMapping/>
@@ -2514,6 +2218,818 @@
       </p:grpSpPr>
       <p:sp>
         <p:nvSpPr>
+          <p:cNvPr id="2" name="object 2"/>
+          <p:cNvSpPr txBox="1">
+            <a:spLocks noGrp="1"/>
+          </p:cNvSpPr>
+          <p:nvPr>
+            <p:ph type="title"/>
+          </p:nvPr>
+        </p:nvSpPr>
+        <p:spPr>
+          <a:xfrm>
+            <a:off x="1310052" y="555751"/>
+            <a:ext cx="5103448" cy="602088"/>
+          </a:xfrm>
+          <a:prstGeom prst="rect">
+            <a:avLst/>
+          </a:prstGeom>
+        </p:spPr>
+        <p:txBody>
+          <a:bodyPr vert="horz" wrap="square" lIns="0" tIns="12065" rIns="0" bIns="0" rtlCol="0">
+            <a:spAutoFit/>
+          </a:bodyPr>
+          <a:lstStyle/>
+          <a:p>
+            <a:pPr marL="12700">
+              <a:lnSpc>
+                <a:spcPts val="4560"/>
+              </a:lnSpc>
+            </a:pPr>
+            <a:r>
+              <a:rPr lang="en-US" altLang="zh-TW" sz="4000" spc="365" dirty="0" smtClean="0">
+                <a:uFillTx/>
+              </a:rPr>
+              <a:t>What am I doing</a:t>
+            </a:r>
+            <a:r>
+              <a:rPr sz="4000" spc="365" dirty="0" smtClean="0">
+                <a:uFillTx/>
+              </a:rPr>
+              <a:t>?!</a:t>
+            </a:r>
+            <a:endParaRPr sz="4000" dirty="0">
+              <a:uFillTx/>
+            </a:endParaRPr>
+          </a:p>
+        </p:txBody>
+      </p:sp>
+      <p:sp>
+        <p:nvSpPr>
+          <p:cNvPr id="3" name="object 3"/>
+          <p:cNvSpPr txBox="1">
+            <a:spLocks noGrp="1"/>
+          </p:cNvSpPr>
+          <p:nvPr>
+            <p:ph type="body" idx="1"/>
+          </p:nvPr>
+        </p:nvSpPr>
+        <p:spPr>
+          <a:xfrm>
+            <a:off x="1040682" y="2108802"/>
+            <a:ext cx="8612035" cy="3503523"/>
+          </a:xfrm>
+          <a:prstGeom prst="rect">
+            <a:avLst/>
+          </a:prstGeom>
+        </p:spPr>
+        <p:txBody>
+          <a:bodyPr vert="horz" wrap="square" lIns="0" tIns="104140" rIns="0" bIns="0" rtlCol="0">
+            <a:spAutoFit/>
+          </a:bodyPr>
+          <a:lstStyle/>
+          <a:p>
+            <a:pPr marL="739140" indent="-182880">
+              <a:lnSpc>
+                <a:spcPct val="100000"/>
+              </a:lnSpc>
+              <a:spcBef>
+                <a:spcPts val="820"/>
+              </a:spcBef>
+              <a:buClr>
+                <a:srgbClr val="262626"/>
+              </a:buClr>
+              <a:buChar char="◦"/>
+            </a:pPr>
+            <a:r>
+              <a:rPr lang="zh-TW" altLang="en-US" sz="2000" spc="145" dirty="0" smtClean="0">
+                <a:uFillTx/>
+              </a:rPr>
+              <a:t>我將要做</a:t>
+            </a:r>
+            <a:r>
+              <a:rPr lang="en-US" altLang="zh-TW" sz="2000" spc="145" dirty="0" smtClean="0">
+                <a:uFillTx/>
+              </a:rPr>
+              <a:t>”</a:t>
+            </a:r>
+            <a:r>
+              <a:rPr lang="zh-TW" altLang="en-US" sz="2000" spc="145" dirty="0" smtClean="0">
+                <a:uFillTx/>
+              </a:rPr>
+              <a:t>迷宮球</a:t>
+            </a:r>
+            <a:r>
+              <a:rPr lang="en-US" altLang="zh-TW" sz="2000" spc="145" dirty="0" smtClean="0">
+                <a:uFillTx/>
+              </a:rPr>
+              <a:t>” app</a:t>
+            </a:r>
+            <a:r>
+              <a:rPr sz="2000" spc="145" dirty="0" smtClean="0">
+                <a:uFillTx/>
+              </a:rPr>
+              <a:t>.</a:t>
+            </a:r>
+            <a:endParaRPr sz="2000" spc="145" dirty="0">
+              <a:uFillTx/>
+            </a:endParaRPr>
+          </a:p>
+          <a:p>
+            <a:pPr marL="739140" indent="-182880">
+              <a:lnSpc>
+                <a:spcPct val="100000"/>
+              </a:lnSpc>
+              <a:spcBef>
+                <a:spcPts val="720"/>
+              </a:spcBef>
+              <a:buClr>
+                <a:srgbClr val="262626"/>
+              </a:buClr>
+              <a:buChar char="◦"/>
+            </a:pPr>
+            <a:r>
+              <a:rPr lang="zh-TW" altLang="en-US" sz="2000" spc="125" dirty="0" smtClean="0">
+                <a:uFillTx/>
+              </a:rPr>
+              <a:t>以下是這個</a:t>
+            </a:r>
+            <a:r>
+              <a:rPr lang="en-US" altLang="zh-TW" sz="2000" spc="125" dirty="0" smtClean="0">
+                <a:uFillTx/>
+              </a:rPr>
+              <a:t>app</a:t>
+            </a:r>
+            <a:r>
+              <a:rPr lang="zh-TW" altLang="en-US" sz="2000" spc="125" dirty="0" smtClean="0">
+                <a:uFillTx/>
+              </a:rPr>
+              <a:t>的功能</a:t>
+            </a:r>
+            <a:r>
+              <a:rPr sz="2000" spc="125" dirty="0" smtClean="0">
+                <a:uFillTx/>
+              </a:rPr>
+              <a:t>:</a:t>
+            </a:r>
+            <a:endParaRPr sz="2000" spc="125" dirty="0">
+              <a:uFillTx/>
+            </a:endParaRPr>
+          </a:p>
+          <a:p>
+            <a:pPr marL="899160" lvl="1" indent="-342900">
+              <a:spcBef>
+                <a:spcPts val="720"/>
+              </a:spcBef>
+              <a:buClr>
+                <a:srgbClr val="262626"/>
+              </a:buClr>
+              <a:buFontTx/>
+              <a:buChar char="•"/>
+            </a:pPr>
+            <a:r>
+              <a:rPr lang="zh-TW" altLang="en-US" sz="2000" dirty="0" smtClean="0">
+                <a:uFillTx/>
+                <a:latin typeface="Times New Roman"/>
+                <a:cs typeface="Times New Roman"/>
+              </a:rPr>
+              <a:t>關卡進行中時，會顯示剩餘時間</a:t>
+            </a:r>
+            <a:endParaRPr lang="en-US" altLang="zh-TW" sz="2000" dirty="0" smtClean="0">
+              <a:uFillTx/>
+              <a:latin typeface="Times New Roman"/>
+              <a:cs typeface="Times New Roman"/>
+            </a:endParaRPr>
+          </a:p>
+          <a:p>
+            <a:pPr marL="899160" lvl="1" indent="-342900">
+              <a:spcBef>
+                <a:spcPts val="720"/>
+              </a:spcBef>
+              <a:buClr>
+                <a:srgbClr val="262626"/>
+              </a:buClr>
+              <a:buFontTx/>
+              <a:buChar char="•"/>
+            </a:pPr>
+            <a:r>
+              <a:rPr lang="zh-TW" altLang="en-US" sz="2000" dirty="0" smtClean="0">
+                <a:uFillTx/>
+                <a:latin typeface="Times New Roman"/>
+                <a:cs typeface="Times New Roman"/>
+              </a:rPr>
+              <a:t>觸碰螢幕，遊戲暫停，並顯示訊息，告知使用者繼續遊戲，或是重新開始。</a:t>
+            </a:r>
+            <a:endParaRPr lang="en-US" altLang="zh-TW" sz="2000" dirty="0" smtClean="0">
+              <a:uFillTx/>
+              <a:latin typeface="Times New Roman"/>
+              <a:cs typeface="Times New Roman"/>
+            </a:endParaRPr>
+          </a:p>
+          <a:p>
+            <a:pPr marL="899160" lvl="1" indent="-342900">
+              <a:spcBef>
+                <a:spcPts val="720"/>
+              </a:spcBef>
+              <a:buClr>
+                <a:srgbClr val="262626"/>
+              </a:buClr>
+              <a:buFontTx/>
+              <a:buChar char="•"/>
+            </a:pPr>
+            <a:r>
+              <a:rPr lang="zh-TW" altLang="en-US" sz="2000" spc="25" dirty="0" smtClean="0">
+                <a:uFillTx/>
+                <a:latin typeface="Times New Roman"/>
+                <a:cs typeface="Times New Roman"/>
+              </a:rPr>
+              <a:t>藉由轉動</a:t>
+            </a:r>
+            <a:r>
+              <a:rPr lang="en-US" altLang="zh-TW" sz="2000" spc="25" dirty="0" err="1" smtClean="0">
+                <a:uFillTx/>
+                <a:latin typeface="Times New Roman"/>
+                <a:cs typeface="Times New Roman"/>
+              </a:rPr>
+              <a:t>iphone</a:t>
+            </a:r>
+            <a:r>
+              <a:rPr lang="zh-TW" altLang="en-US" sz="2000" spc="25" dirty="0">
+                <a:uFillTx/>
+                <a:latin typeface="Times New Roman"/>
+                <a:cs typeface="Times New Roman"/>
+              </a:rPr>
+              <a:t>來讓球</a:t>
+            </a:r>
+            <a:r>
+              <a:rPr lang="zh-TW" altLang="en-US" sz="2000" spc="25" dirty="0" smtClean="0">
+                <a:uFillTx/>
+                <a:latin typeface="Times New Roman"/>
+                <a:cs typeface="Times New Roman"/>
+              </a:rPr>
+              <a:t>移動</a:t>
+            </a:r>
+            <a:endParaRPr lang="en-US" altLang="zh-TW" sz="2000" spc="25" dirty="0" smtClean="0">
+              <a:uFillTx/>
+              <a:latin typeface="Times New Roman"/>
+              <a:cs typeface="Times New Roman"/>
+            </a:endParaRPr>
+          </a:p>
+          <a:p>
+            <a:pPr marL="899160" lvl="1" indent="-342900">
+              <a:spcBef>
+                <a:spcPts val="720"/>
+              </a:spcBef>
+              <a:buClr>
+                <a:srgbClr val="262626"/>
+              </a:buClr>
+              <a:buFontTx/>
+              <a:buChar char="•"/>
+            </a:pPr>
+            <a:r>
+              <a:rPr lang="zh-TW" altLang="en-US" sz="2000" spc="25" dirty="0">
+                <a:uFillTx/>
+                <a:latin typeface="Times New Roman"/>
+                <a:cs typeface="Times New Roman"/>
+              </a:rPr>
+              <a:t>當</a:t>
+            </a:r>
+            <a:r>
+              <a:rPr lang="zh-TW" altLang="en-US" sz="2000" spc="25" dirty="0" smtClean="0">
+                <a:uFillTx/>
+                <a:latin typeface="Times New Roman"/>
+                <a:cs typeface="Times New Roman"/>
+              </a:rPr>
+              <a:t>球在時間內移動到終點，就過關，並顯示過關訊息</a:t>
+            </a:r>
+            <a:endParaRPr lang="en-US" altLang="zh-TW" sz="2000" spc="25" dirty="0" smtClean="0">
+              <a:uFillTx/>
+              <a:latin typeface="Times New Roman"/>
+              <a:cs typeface="Times New Roman"/>
+            </a:endParaRPr>
+          </a:p>
+          <a:p>
+            <a:pPr marL="899160" lvl="1" indent="-342900">
+              <a:spcBef>
+                <a:spcPts val="720"/>
+              </a:spcBef>
+              <a:buClr>
+                <a:srgbClr val="262626"/>
+              </a:buClr>
+              <a:buFontTx/>
+              <a:buChar char="•"/>
+            </a:pPr>
+            <a:r>
+              <a:rPr lang="zh-TW" altLang="en-US" sz="2000" spc="25" dirty="0">
+                <a:uFillTx/>
+                <a:latin typeface="Times New Roman"/>
+                <a:cs typeface="Times New Roman"/>
+              </a:rPr>
+              <a:t>當球在時間</a:t>
+            </a:r>
+            <a:r>
+              <a:rPr lang="zh-TW" altLang="en-US" sz="2000" spc="25" dirty="0" smtClean="0">
+                <a:uFillTx/>
+                <a:latin typeface="Times New Roman"/>
+                <a:cs typeface="Times New Roman"/>
+              </a:rPr>
+              <a:t>內尚未移動</a:t>
+            </a:r>
+            <a:r>
+              <a:rPr lang="zh-TW" altLang="en-US" sz="2000" spc="25" dirty="0" smtClean="0">
+                <a:latin typeface="Times New Roman"/>
+                <a:cs typeface="Times New Roman"/>
+              </a:rPr>
+              <a:t>到終點，</a:t>
+            </a:r>
+            <a:r>
+              <a:rPr lang="zh-TW" altLang="en-US" sz="2000" spc="25" dirty="0" smtClean="0">
+                <a:uFillTx/>
+                <a:latin typeface="Times New Roman"/>
+                <a:cs typeface="Times New Roman"/>
+              </a:rPr>
+              <a:t>就</a:t>
+            </a:r>
+            <a:r>
+              <a:rPr lang="zh-TW" altLang="en-US" sz="2000" spc="50" dirty="0">
+                <a:uFillTx/>
+              </a:rPr>
+              <a:t>失敗</a:t>
+            </a:r>
+            <a:r>
+              <a:rPr lang="zh-TW" altLang="en-US" sz="2000" spc="25" dirty="0" smtClean="0">
+                <a:uFillTx/>
+                <a:latin typeface="Times New Roman"/>
+                <a:cs typeface="Times New Roman"/>
+              </a:rPr>
+              <a:t>，</a:t>
+            </a:r>
+            <a:r>
+              <a:rPr lang="zh-TW" altLang="en-US" sz="2000" spc="25" dirty="0">
+                <a:uFillTx/>
+                <a:latin typeface="Times New Roman"/>
+                <a:cs typeface="Times New Roman"/>
+              </a:rPr>
+              <a:t>並</a:t>
+            </a:r>
+            <a:r>
+              <a:rPr lang="zh-TW" altLang="en-US" sz="2000" spc="25" dirty="0" smtClean="0">
+                <a:uFillTx/>
+                <a:latin typeface="Times New Roman"/>
+                <a:cs typeface="Times New Roman"/>
+              </a:rPr>
+              <a:t>顯示</a:t>
+            </a:r>
+            <a:r>
+              <a:rPr lang="zh-TW" altLang="en-US" sz="2000" spc="50" dirty="0" smtClean="0">
+                <a:uFillTx/>
+              </a:rPr>
+              <a:t>失敗</a:t>
+            </a:r>
+            <a:r>
+              <a:rPr lang="zh-TW" altLang="en-US" sz="2000" spc="25" dirty="0" smtClean="0">
+                <a:latin typeface="Times New Roman"/>
+                <a:cs typeface="Times New Roman"/>
+              </a:rPr>
+              <a:t>訊息</a:t>
+            </a:r>
+            <a:endParaRPr sz="2000" dirty="0">
+              <a:uFillTx/>
+              <a:latin typeface="Times New Roman"/>
+              <a:cs typeface="Times New Roman"/>
+            </a:endParaRPr>
+          </a:p>
+          <a:p>
+            <a:pPr marL="899160" indent="-342900">
+              <a:lnSpc>
+                <a:spcPct val="100000"/>
+              </a:lnSpc>
+              <a:spcBef>
+                <a:spcPts val="715"/>
+              </a:spcBef>
+              <a:buClr>
+                <a:srgbClr val="262626"/>
+              </a:buClr>
+              <a:buChar char="•"/>
+            </a:pPr>
+            <a:r>
+              <a:rPr lang="en-US" sz="2000" spc="140" dirty="0" smtClean="0">
+                <a:uFillTx/>
+              </a:rPr>
+              <a:t>iPhone </a:t>
+            </a:r>
+            <a:r>
+              <a:rPr sz="2000" spc="75" dirty="0" smtClean="0">
+                <a:uFillTx/>
+              </a:rPr>
+              <a:t>only.</a:t>
+            </a:r>
+            <a:endParaRPr sz="2000" spc="114" dirty="0">
+              <a:uFillTx/>
+            </a:endParaRPr>
+          </a:p>
+        </p:txBody>
+      </p:sp>
+    </p:spTree>
+  </p:cSld>
+  <p:clrMapOvr>
+    <a:masterClrMapping/>
+  </p:clrMapOvr>
+  <p:timing>
+    <p:tnLst>
+      <p:par>
+        <p:cTn id="1" dur="indefinite" restart="never" nodeType="tmRoot"/>
+      </p:par>
+    </p:tnLst>
+  </p:timing>
+</p:sld>
+</file>
+
+<file path=ppt/slides/slide4.xml><?xml version="1.0" encoding="utf-8"?>
+<p:sld xmlns:a="http://schemas.openxmlformats.org/drawingml/2006/main" xmlns:r="http://schemas.openxmlformats.org/officeDocument/2006/relationships" xmlns:p="http://schemas.openxmlformats.org/presentationml/2006/main">
+  <p:cSld>
+    <p:spTree>
+      <p:nvGrpSpPr>
+        <p:cNvPr id="1" name=""/>
+        <p:cNvGrpSpPr/>
+        <p:nvPr/>
+      </p:nvGrpSpPr>
+      <p:grpSpPr>
+        <a:xfrm>
+          <a:off x="0" y="0"/>
+          <a:ext cx="0" cy="0"/>
+          <a:chOff x="0" y="0"/>
+          <a:chExt cx="0" cy="0"/>
+        </a:xfrm>
+      </p:grpSpPr>
+      <p:sp>
+        <p:nvSpPr>
+          <p:cNvPr id="4" name="object 2"/>
+          <p:cNvSpPr txBox="1">
+            <a:spLocks noGrp="1"/>
+          </p:cNvSpPr>
+          <p:nvPr>
+            <p:ph type="title"/>
+          </p:nvPr>
+        </p:nvSpPr>
+        <p:spPr>
+          <a:xfrm>
+            <a:off x="1310052" y="555751"/>
+            <a:ext cx="5103448" cy="602088"/>
+          </a:xfrm>
+          <a:prstGeom prst="rect">
+            <a:avLst/>
+          </a:prstGeom>
+        </p:spPr>
+        <p:txBody>
+          <a:bodyPr vert="horz" wrap="square" lIns="0" tIns="12065" rIns="0" bIns="0" rtlCol="0">
+            <a:spAutoFit/>
+          </a:bodyPr>
+          <a:lstStyle/>
+          <a:p>
+            <a:pPr marL="12700">
+              <a:lnSpc>
+                <a:spcPts val="4560"/>
+              </a:lnSpc>
+            </a:pPr>
+            <a:r>
+              <a:rPr lang="zh-TW" altLang="en-US" sz="4000" dirty="0"/>
+              <a:t>流程說明</a:t>
+            </a:r>
+            <a:endParaRPr sz="4000" dirty="0">
+              <a:uFillTx/>
+            </a:endParaRPr>
+          </a:p>
+        </p:txBody>
+      </p:sp>
+      <p:pic>
+        <p:nvPicPr>
+          <p:cNvPr id="1041" name="Picture 17" descr="C:\Users\MyLaptop\Desktop\IMG_0202.PNG"/>
+          <p:cNvPicPr>
+            <a:picLocks noChangeAspect="1" noChangeArrowheads="1"/>
+          </p:cNvPicPr>
+          <p:nvPr/>
+        </p:nvPicPr>
+        <p:blipFill>
+          <a:blip r:embed="rId2">
+            <a:extLst>
+              <a:ext uri="{28A0092B-C50C-407E-A947-70E740481C1C}">
+                <a14:useLocalDpi xmlns:a14="http://schemas.microsoft.com/office/drawing/2010/main" val="0"/>
+              </a:ext>
+            </a:extLst>
+          </a:blip>
+          <a:srcRect/>
+          <a:stretch>
+            <a:fillRect/>
+          </a:stretch>
+        </p:blipFill>
+        <p:spPr bwMode="auto">
+          <a:xfrm>
+            <a:off x="810196" y="1837209"/>
+            <a:ext cx="2107635" cy="3744416"/>
+          </a:xfrm>
+          <a:prstGeom prst="rect">
+            <a:avLst/>
+          </a:prstGeom>
+          <a:noFill/>
+          <a:extLst>
+            <a:ext uri="{909E8E84-426E-40DD-AFC4-6F175D3DCCD1}">
+              <a14:hiddenFill xmlns:a14="http://schemas.microsoft.com/office/drawing/2010/main">
+                <a:solidFill>
+                  <a:srgbClr val="FFFFFF"/>
+                </a:solidFill>
+              </a14:hiddenFill>
+            </a:ext>
+          </a:extLst>
+        </p:spPr>
+      </p:pic>
+      <p:pic>
+        <p:nvPicPr>
+          <p:cNvPr id="1042" name="Picture 18" descr="C:\Users\MyLaptop\Desktop\IMG_0203.PNG"/>
+          <p:cNvPicPr>
+            <a:picLocks noChangeAspect="1" noChangeArrowheads="1"/>
+          </p:cNvPicPr>
+          <p:nvPr/>
+        </p:nvPicPr>
+        <p:blipFill>
+          <a:blip r:embed="rId3">
+            <a:extLst>
+              <a:ext uri="{28A0092B-C50C-407E-A947-70E740481C1C}">
+                <a14:useLocalDpi xmlns:a14="http://schemas.microsoft.com/office/drawing/2010/main" val="0"/>
+              </a:ext>
+            </a:extLst>
+          </a:blip>
+          <a:srcRect/>
+          <a:stretch>
+            <a:fillRect/>
+          </a:stretch>
+        </p:blipFill>
+        <p:spPr bwMode="auto">
+          <a:xfrm>
+            <a:off x="3258468" y="1837209"/>
+            <a:ext cx="2088232" cy="3709944"/>
+          </a:xfrm>
+          <a:prstGeom prst="rect">
+            <a:avLst/>
+          </a:prstGeom>
+          <a:noFill/>
+          <a:extLst>
+            <a:ext uri="{909E8E84-426E-40DD-AFC4-6F175D3DCCD1}">
+              <a14:hiddenFill xmlns:a14="http://schemas.microsoft.com/office/drawing/2010/main">
+                <a:solidFill>
+                  <a:srgbClr val="FFFFFF"/>
+                </a:solidFill>
+              </a14:hiddenFill>
+            </a:ext>
+          </a:extLst>
+        </p:spPr>
+      </p:pic>
+      <p:pic>
+        <p:nvPicPr>
+          <p:cNvPr id="1043" name="Picture 19" descr="C:\Users\MyLaptop\Desktop\IMG_0204.PNG"/>
+          <p:cNvPicPr>
+            <a:picLocks noChangeAspect="1" noChangeArrowheads="1"/>
+          </p:cNvPicPr>
+          <p:nvPr/>
+        </p:nvPicPr>
+        <p:blipFill>
+          <a:blip r:embed="rId4">
+            <a:extLst>
+              <a:ext uri="{28A0092B-C50C-407E-A947-70E740481C1C}">
+                <a14:useLocalDpi xmlns:a14="http://schemas.microsoft.com/office/drawing/2010/main" val="0"/>
+              </a:ext>
+            </a:extLst>
+          </a:blip>
+          <a:srcRect/>
+          <a:stretch>
+            <a:fillRect/>
+          </a:stretch>
+        </p:blipFill>
+        <p:spPr bwMode="auto">
+          <a:xfrm>
+            <a:off x="5706739" y="1837209"/>
+            <a:ext cx="2088233" cy="3709944"/>
+          </a:xfrm>
+          <a:prstGeom prst="rect">
+            <a:avLst/>
+          </a:prstGeom>
+          <a:noFill/>
+          <a:extLst>
+            <a:ext uri="{909E8E84-426E-40DD-AFC4-6F175D3DCCD1}">
+              <a14:hiddenFill xmlns:a14="http://schemas.microsoft.com/office/drawing/2010/main">
+                <a:solidFill>
+                  <a:srgbClr val="FFFFFF"/>
+                </a:solidFill>
+              </a14:hiddenFill>
+            </a:ext>
+          </a:extLst>
+        </p:spPr>
+      </p:pic>
+      <p:pic>
+        <p:nvPicPr>
+          <p:cNvPr id="1044" name="Picture 20" descr="C:\Users\MyLaptop\Desktop\IMG_0205.PNG"/>
+          <p:cNvPicPr>
+            <a:picLocks noChangeAspect="1" noChangeArrowheads="1"/>
+          </p:cNvPicPr>
+          <p:nvPr/>
+        </p:nvPicPr>
+        <p:blipFill>
+          <a:blip r:embed="rId5">
+            <a:extLst>
+              <a:ext uri="{28A0092B-C50C-407E-A947-70E740481C1C}">
+                <a14:useLocalDpi xmlns:a14="http://schemas.microsoft.com/office/drawing/2010/main" val="0"/>
+              </a:ext>
+            </a:extLst>
+          </a:blip>
+          <a:srcRect/>
+          <a:stretch>
+            <a:fillRect/>
+          </a:stretch>
+        </p:blipFill>
+        <p:spPr bwMode="auto">
+          <a:xfrm>
+            <a:off x="8155012" y="1864894"/>
+            <a:ext cx="2057065" cy="3654573"/>
+          </a:xfrm>
+          <a:prstGeom prst="rect">
+            <a:avLst/>
+          </a:prstGeom>
+          <a:noFill/>
+          <a:extLst>
+            <a:ext uri="{909E8E84-426E-40DD-AFC4-6F175D3DCCD1}">
+              <a14:hiddenFill xmlns:a14="http://schemas.microsoft.com/office/drawing/2010/main">
+                <a:solidFill>
+                  <a:srgbClr val="FFFFFF"/>
+                </a:solidFill>
+              </a14:hiddenFill>
+            </a:ext>
+          </a:extLst>
+        </p:spPr>
+      </p:pic>
+      <p:sp>
+        <p:nvSpPr>
+          <p:cNvPr id="14" name="文字方塊 13"/>
+          <p:cNvSpPr txBox="1"/>
+          <p:nvPr/>
+        </p:nvSpPr>
+        <p:spPr>
+          <a:xfrm>
+            <a:off x="1079183" y="5860980"/>
+            <a:ext cx="1569660" cy="369332"/>
+          </a:xfrm>
+          <a:prstGeom prst="rect">
+            <a:avLst/>
+          </a:prstGeom>
+        </p:spPr>
+        <p:txBody>
+          <a:bodyPr wrap="none" rtlCol="0">
+            <a:spAutoFit/>
+          </a:bodyPr>
+          <a:lstStyle/>
+          <a:p>
+            <a:r>
+              <a:rPr lang="zh-TW" altLang="en-US" dirty="0" smtClean="0"/>
+              <a:t>遊戲開始畫面</a:t>
+            </a:r>
+            <a:endParaRPr lang="en-US" altLang="zh-TW" dirty="0" smtClean="0"/>
+          </a:p>
+        </p:txBody>
+      </p:sp>
+      <p:sp>
+        <p:nvSpPr>
+          <p:cNvPr id="39" name="文字方塊 38"/>
+          <p:cNvSpPr txBox="1"/>
+          <p:nvPr/>
+        </p:nvSpPr>
+        <p:spPr>
+          <a:xfrm>
+            <a:off x="3633170" y="5867260"/>
+            <a:ext cx="1338828" cy="646331"/>
+          </a:xfrm>
+          <a:prstGeom prst="rect">
+            <a:avLst/>
+          </a:prstGeom>
+        </p:spPr>
+        <p:txBody>
+          <a:bodyPr wrap="none" rtlCol="0">
+            <a:spAutoFit/>
+          </a:bodyPr>
+          <a:lstStyle/>
+          <a:p>
+            <a:pPr algn="ctr"/>
+            <a:r>
+              <a:rPr lang="zh-TW" altLang="en-US" dirty="0" smtClean="0"/>
+              <a:t>觸碰螢幕</a:t>
+            </a:r>
+            <a:endParaRPr lang="en-US" altLang="zh-TW" dirty="0" smtClean="0"/>
+          </a:p>
+          <a:p>
+            <a:pPr algn="ctr"/>
+            <a:r>
+              <a:rPr lang="zh-TW" altLang="en-US" dirty="0" smtClean="0"/>
+              <a:t>以暫停遊戲</a:t>
+            </a:r>
+            <a:endParaRPr lang="en-US" altLang="zh-TW" dirty="0" smtClean="0"/>
+          </a:p>
+        </p:txBody>
+      </p:sp>
+      <p:sp>
+        <p:nvSpPr>
+          <p:cNvPr id="40" name="文字方塊 39"/>
+          <p:cNvSpPr txBox="1"/>
+          <p:nvPr/>
+        </p:nvSpPr>
+        <p:spPr>
+          <a:xfrm>
+            <a:off x="5504360" y="5874126"/>
+            <a:ext cx="2492990" cy="369332"/>
+          </a:xfrm>
+          <a:prstGeom prst="rect">
+            <a:avLst/>
+          </a:prstGeom>
+        </p:spPr>
+        <p:txBody>
+          <a:bodyPr wrap="none" rtlCol="0">
+            <a:spAutoFit/>
+          </a:bodyPr>
+          <a:lstStyle/>
+          <a:p>
+            <a:r>
+              <a:rPr lang="zh-TW" altLang="en-US" dirty="0" smtClean="0"/>
+              <a:t>時間內，尚未到達終點</a:t>
+            </a:r>
+            <a:endParaRPr lang="en-US" altLang="zh-TW" dirty="0" smtClean="0"/>
+          </a:p>
+        </p:txBody>
+      </p:sp>
+      <p:sp>
+        <p:nvSpPr>
+          <p:cNvPr id="41" name="文字方塊 40"/>
+          <p:cNvSpPr txBox="1"/>
+          <p:nvPr/>
+        </p:nvSpPr>
+        <p:spPr>
+          <a:xfrm>
+            <a:off x="8155012" y="5854560"/>
+            <a:ext cx="2031325" cy="369332"/>
+          </a:xfrm>
+          <a:prstGeom prst="rect">
+            <a:avLst/>
+          </a:prstGeom>
+        </p:spPr>
+        <p:txBody>
+          <a:bodyPr wrap="none" rtlCol="0">
+            <a:spAutoFit/>
+          </a:bodyPr>
+          <a:lstStyle/>
+          <a:p>
+            <a:r>
+              <a:rPr lang="zh-TW" altLang="en-US" dirty="0" smtClean="0"/>
+              <a:t>時間內，到達終點</a:t>
+            </a:r>
+            <a:endParaRPr lang="en-US" altLang="zh-TW" dirty="0" smtClean="0"/>
+          </a:p>
+        </p:txBody>
+      </p:sp>
+    </p:spTree>
+    <p:extLst>
+      <p:ext uri="{BB962C8B-B14F-4D97-AF65-F5344CB8AC3E}">
+        <p14:creationId xmlns:p14="http://schemas.microsoft.com/office/powerpoint/2010/main" val="1953125355"/>
+      </p:ext>
+    </p:extLst>
+  </p:cSld>
+  <p:clrMapOvr>
+    <a:masterClrMapping/>
+  </p:clrMapOvr>
+  <p:timing>
+    <p:tnLst>
+      <p:par>
+        <p:cTn id="1" dur="indefinite" restart="never" nodeType="tmRoot"/>
+      </p:par>
+    </p:tnLst>
+  </p:timing>
+</p:sld>
+</file>
+
+<file path=ppt/slides/slide5.xml><?xml version="1.0" encoding="utf-8"?>
+<p:sld xmlns:a="http://schemas.openxmlformats.org/drawingml/2006/main" xmlns:r="http://schemas.openxmlformats.org/officeDocument/2006/relationships" xmlns:p="http://schemas.openxmlformats.org/presentationml/2006/main" showMasterSp="0">
+  <p:cSld>
+    <p:spTree>
+      <p:nvGrpSpPr>
+        <p:cNvPr id="1" name=""/>
+        <p:cNvGrpSpPr/>
+        <p:nvPr/>
+      </p:nvGrpSpPr>
+      <p:grpSpPr>
+        <a:xfrm>
+          <a:off x="0" y="0"/>
+          <a:ext cx="0" cy="0"/>
+          <a:chOff x="0" y="0"/>
+          <a:chExt cx="0" cy="0"/>
+        </a:xfrm>
+      </p:grpSpPr>
+      <p:sp>
+        <p:nvSpPr>
           <p:cNvPr id="7" name="object 2"/>
           <p:cNvSpPr txBox="1">
             <a:spLocks/>
@@ -2710,7 +3226,7 @@
 </p:sld>
 </file>
 
-<file path=ppt/slides/slide4.xml><?xml version="1.0" encoding="utf-8"?>
+<file path=ppt/slides/slide6.xml><?xml version="1.0" encoding="utf-8"?>
 <p:sld xmlns:a="http://schemas.openxmlformats.org/drawingml/2006/main" xmlns:r="http://schemas.openxmlformats.org/officeDocument/2006/relationships" xmlns:p="http://schemas.openxmlformats.org/presentationml/2006/main" showMasterSp="0">
   <p:cSld>
     <p:spTree>
@@ -2879,15 +3395,7 @@
                 <a:latin typeface="Times New Roman"/>
                 <a:cs typeface="Times New Roman"/>
               </a:rPr>
-              <a:t>用於建立遊戲</a:t>
-            </a:r>
-            <a:r>
-              <a:rPr lang="zh-TW" altLang="en-US" sz="2000" spc="45" dirty="0" smtClean="0">
-                <a:uFillTx/>
-                <a:latin typeface="Times New Roman"/>
-                <a:cs typeface="Times New Roman"/>
-              </a:rPr>
-              <a:t>專案</a:t>
+              <a:t>用於建立遊戲專案</a:t>
             </a:r>
             <a:endParaRPr lang="en-US" altLang="zh-TW" sz="2000" spc="45" dirty="0" smtClean="0">
               <a:uFillTx/>
@@ -2941,15 +3449,7 @@
                 <a:latin typeface="Times New Roman"/>
                 <a:cs typeface="Times New Roman"/>
               </a:rPr>
-              <a:t>遊戲物體碰撞偵測與</a:t>
-            </a:r>
-            <a:r>
-              <a:rPr lang="zh-TW" altLang="en-US" sz="2000" spc="110" dirty="0" smtClean="0">
-                <a:uFillTx/>
-                <a:latin typeface="Times New Roman"/>
-                <a:cs typeface="Times New Roman"/>
-              </a:rPr>
-              <a:t>反應</a:t>
+              <a:t>遊戲物體碰撞偵測與反應</a:t>
             </a:r>
             <a:endParaRPr lang="en-US" altLang="zh-TW" sz="2000" spc="110" dirty="0" smtClean="0">
               <a:uFillTx/>
@@ -3107,15 +3607,7 @@
                 <a:latin typeface="Times New Roman"/>
                 <a:cs typeface="Times New Roman"/>
               </a:rPr>
-              <a:t>顯示告知玩家</a:t>
-            </a:r>
-            <a:r>
-              <a:rPr lang="zh-TW" altLang="en-US" sz="2000" dirty="0" smtClean="0">
-                <a:uFillTx/>
-                <a:latin typeface="Times New Roman"/>
-                <a:cs typeface="Times New Roman"/>
-              </a:rPr>
-              <a:t>過關</a:t>
+              <a:t>顯示告知玩家過關</a:t>
             </a:r>
             <a:r>
               <a:rPr lang="zh-TW" altLang="en-US" sz="2000" dirty="0" smtClean="0">
@@ -3155,7 +3647,461 @@
 </p:sld>
 </file>
 
-<file path=ppt/slides/slide5.xml><?xml version="1.0" encoding="utf-8"?>
+<file path=ppt/slides/slide7.xml><?xml version="1.0" encoding="utf-8"?>
+<p:sld xmlns:a="http://schemas.openxmlformats.org/drawingml/2006/main" xmlns:r="http://schemas.openxmlformats.org/officeDocument/2006/relationships" xmlns:p="http://schemas.openxmlformats.org/presentationml/2006/main">
+  <p:cSld>
+    <p:spTree>
+      <p:nvGrpSpPr>
+        <p:cNvPr id="1" name=""/>
+        <p:cNvGrpSpPr/>
+        <p:nvPr/>
+      </p:nvGrpSpPr>
+      <p:grpSpPr>
+        <a:xfrm>
+          <a:off x="0" y="0"/>
+          <a:ext cx="0" cy="0"/>
+          <a:chOff x="0" y="0"/>
+          <a:chExt cx="0" cy="0"/>
+        </a:xfrm>
+      </p:grpSpPr>
+      <p:sp>
+        <p:nvSpPr>
+          <p:cNvPr id="4" name="object 2"/>
+          <p:cNvSpPr txBox="1">
+            <a:spLocks noGrp="1"/>
+          </p:cNvSpPr>
+          <p:nvPr>
+            <p:ph type="title"/>
+          </p:nvPr>
+        </p:nvSpPr>
+        <p:spPr>
+          <a:xfrm>
+            <a:off x="1310052" y="555751"/>
+            <a:ext cx="6826250" cy="602088"/>
+          </a:xfrm>
+          <a:prstGeom prst="rect">
+            <a:avLst/>
+          </a:prstGeom>
+        </p:spPr>
+        <p:txBody>
+          <a:bodyPr vert="horz" wrap="square" lIns="0" tIns="12065" rIns="0" bIns="0" rtlCol="0">
+            <a:spAutoFit/>
+          </a:bodyPr>
+          <a:lstStyle/>
+          <a:p>
+            <a:pPr marL="12700">
+              <a:lnSpc>
+                <a:spcPts val="4560"/>
+              </a:lnSpc>
+            </a:pPr>
+            <a:r>
+              <a:rPr lang="zh-TW" altLang="en-US" sz="4000" dirty="0"/>
+              <a:t>實作困難處</a:t>
+            </a:r>
+            <a:endParaRPr sz="4000" dirty="0">
+              <a:uFillTx/>
+            </a:endParaRPr>
+          </a:p>
+        </p:txBody>
+      </p:sp>
+      <p:sp>
+        <p:nvSpPr>
+          <p:cNvPr id="6" name="object 3"/>
+          <p:cNvSpPr txBox="1">
+            <a:spLocks/>
+          </p:cNvSpPr>
+          <p:nvPr/>
+        </p:nvSpPr>
+        <p:spPr>
+          <a:xfrm>
+            <a:off x="1310099" y="2360321"/>
+            <a:ext cx="7164705" cy="1958870"/>
+          </a:xfrm>
+          <a:prstGeom prst="rect">
+            <a:avLst/>
+          </a:prstGeom>
+        </p:spPr>
+        <p:txBody>
+          <a:bodyPr vert="horz" wrap="square" lIns="0" tIns="34925" rIns="0" bIns="0" rtlCol="0">
+            <a:spAutoFit/>
+          </a:bodyPr>
+          <a:lstStyle/>
+          <a:p>
+            <a:pPr marL="355600" indent="-342900">
+              <a:lnSpc>
+                <a:spcPct val="100000"/>
+              </a:lnSpc>
+              <a:spcBef>
+                <a:spcPts val="275"/>
+              </a:spcBef>
+              <a:buClr>
+                <a:srgbClr val="262626"/>
+              </a:buClr>
+              <a:buChar char="•"/>
+            </a:pPr>
+            <a:r>
+              <a:rPr lang="en-US" sz="2000" dirty="0" err="1" smtClean="0">
+                <a:latin typeface="Times New Roman"/>
+                <a:cs typeface="Times New Roman"/>
+              </a:rPr>
+              <a:t>GameScene.sks</a:t>
+            </a:r>
+            <a:r>
+              <a:rPr lang="zh-TW" altLang="en-US" sz="2000" dirty="0" smtClean="0">
+                <a:latin typeface="Times New Roman"/>
+                <a:cs typeface="Times New Roman"/>
+              </a:rPr>
+              <a:t>無法正常開啟</a:t>
+            </a:r>
+            <a:endParaRPr lang="en-US" altLang="zh-TW" sz="2000" dirty="0" smtClean="0">
+              <a:latin typeface="Times New Roman"/>
+              <a:cs typeface="Times New Roman"/>
+            </a:endParaRPr>
+          </a:p>
+          <a:p>
+            <a:pPr marL="812800" lvl="1" indent="-342900">
+              <a:spcBef>
+                <a:spcPts val="275"/>
+              </a:spcBef>
+              <a:buClr>
+                <a:srgbClr val="262626"/>
+              </a:buClr>
+              <a:buChar char="•"/>
+            </a:pPr>
+            <a:r>
+              <a:rPr lang="zh-TW" altLang="en-US" sz="2000" dirty="0" smtClean="0">
+                <a:latin typeface="Times New Roman"/>
+                <a:cs typeface="Times New Roman"/>
+              </a:rPr>
+              <a:t>於</a:t>
+            </a:r>
+            <a:r>
+              <a:rPr lang="en-US" altLang="zh-TW" sz="2000" dirty="0" err="1" smtClean="0">
+                <a:latin typeface="Times New Roman"/>
+                <a:cs typeface="Times New Roman"/>
+              </a:rPr>
+              <a:t>Xcode</a:t>
+            </a:r>
+            <a:r>
+              <a:rPr lang="zh-TW" altLang="en-US" sz="2000" dirty="0" smtClean="0">
+                <a:latin typeface="Times New Roman"/>
+                <a:cs typeface="Times New Roman"/>
+              </a:rPr>
+              <a:t>中開啟</a:t>
+            </a:r>
+            <a:r>
+              <a:rPr lang="en-US" altLang="zh-TW" sz="2000" dirty="0" err="1" smtClean="0">
+                <a:latin typeface="Times New Roman"/>
+                <a:cs typeface="Times New Roman"/>
+              </a:rPr>
+              <a:t>GameScene.sks</a:t>
+            </a:r>
+            <a:r>
+              <a:rPr lang="zh-TW" altLang="en-US" sz="2000" dirty="0" smtClean="0">
+                <a:latin typeface="Times New Roman"/>
+                <a:cs typeface="Times New Roman"/>
+              </a:rPr>
+              <a:t>，會造成</a:t>
+            </a:r>
+            <a:r>
+              <a:rPr lang="en-US" altLang="zh-TW" sz="2000" dirty="0" err="1" smtClean="0">
+                <a:latin typeface="Times New Roman"/>
+                <a:cs typeface="Times New Roman"/>
+              </a:rPr>
+              <a:t>Xcode</a:t>
+            </a:r>
+            <a:r>
+              <a:rPr lang="zh-TW" altLang="en-US" sz="2000" dirty="0" smtClean="0">
+                <a:latin typeface="Times New Roman"/>
+                <a:cs typeface="Times New Roman"/>
+              </a:rPr>
+              <a:t>閃退，無法開啟。</a:t>
+            </a:r>
+            <a:endParaRPr lang="en-US" altLang="zh-TW" sz="2000" dirty="0" smtClean="0">
+              <a:latin typeface="Times New Roman"/>
+              <a:cs typeface="Times New Roman"/>
+            </a:endParaRPr>
+          </a:p>
+          <a:p>
+            <a:pPr marL="812800" lvl="1" indent="-342900">
+              <a:spcBef>
+                <a:spcPts val="275"/>
+              </a:spcBef>
+              <a:buClr>
+                <a:srgbClr val="262626"/>
+              </a:buClr>
+              <a:buChar char="•"/>
+            </a:pPr>
+            <a:r>
+              <a:rPr lang="zh-TW" altLang="en-US" sz="2000" dirty="0">
+                <a:uFillTx/>
+                <a:latin typeface="Times New Roman"/>
+                <a:cs typeface="Times New Roman"/>
+              </a:rPr>
+              <a:t>解決</a:t>
+            </a:r>
+            <a:r>
+              <a:rPr lang="zh-TW" altLang="en-US" sz="2000" dirty="0" smtClean="0">
+                <a:uFillTx/>
+                <a:latin typeface="Times New Roman"/>
+                <a:cs typeface="Times New Roman"/>
+              </a:rPr>
+              <a:t>辦法</a:t>
+            </a:r>
+            <a:r>
+              <a:rPr lang="zh-TW" altLang="en-US" sz="2000" dirty="0" smtClean="0">
+                <a:latin typeface="Times New Roman"/>
+                <a:cs typeface="Times New Roman"/>
+              </a:rPr>
+              <a:t>：於</a:t>
+            </a:r>
+            <a:r>
+              <a:rPr lang="en-US" altLang="zh-TW" sz="2000" dirty="0" smtClean="0">
+                <a:latin typeface="Times New Roman"/>
+                <a:cs typeface="Times New Roman"/>
+              </a:rPr>
+              <a:t>Terminal</a:t>
+            </a:r>
+            <a:r>
+              <a:rPr lang="zh-TW" altLang="en-US" sz="2000" dirty="0" smtClean="0">
+                <a:latin typeface="Times New Roman"/>
+                <a:cs typeface="Times New Roman"/>
+              </a:rPr>
+              <a:t>執行</a:t>
+            </a:r>
+            <a:r>
+              <a:rPr lang="zh-TW" altLang="en-US" sz="2000" dirty="0">
+                <a:latin typeface="Times New Roman"/>
+                <a:cs typeface="Times New Roman"/>
+              </a:rPr>
+              <a:t>以下</a:t>
+            </a:r>
+            <a:r>
+              <a:rPr lang="zh-TW" altLang="en-US" sz="2000" dirty="0" smtClean="0">
+                <a:latin typeface="Times New Roman"/>
+                <a:cs typeface="Times New Roman"/>
+              </a:rPr>
+              <a:t>網站提供的指令</a:t>
+            </a:r>
+            <a:r>
+              <a:rPr lang="en-US" altLang="zh-TW" sz="2000" dirty="0" smtClean="0">
+                <a:latin typeface="Times New Roman"/>
+                <a:cs typeface="Times New Roman"/>
+              </a:rPr>
+              <a:t>https</a:t>
+            </a:r>
+            <a:r>
+              <a:rPr lang="en-US" altLang="zh-TW" sz="2000" dirty="0">
+                <a:latin typeface="Times New Roman"/>
+                <a:cs typeface="Times New Roman"/>
+              </a:rPr>
+              <a:t>://</a:t>
+            </a:r>
+            <a:r>
+              <a:rPr lang="en-US" altLang="zh-TW" sz="2000" dirty="0" smtClean="0">
+                <a:latin typeface="Times New Roman"/>
+                <a:cs typeface="Times New Roman"/>
+              </a:rPr>
+              <a:t>stackoverflow.com/questions/40912395/xcode-8-x-crashes-with-gamescene-sks-file</a:t>
+            </a:r>
+            <a:endParaRPr sz="2000" dirty="0">
+              <a:uFillTx/>
+              <a:latin typeface="Times New Roman"/>
+              <a:cs typeface="Times New Roman"/>
+            </a:endParaRPr>
+          </a:p>
+        </p:txBody>
+      </p:sp>
+    </p:spTree>
+    <p:extLst>
+      <p:ext uri="{BB962C8B-B14F-4D97-AF65-F5344CB8AC3E}">
+        <p14:creationId xmlns:p14="http://schemas.microsoft.com/office/powerpoint/2010/main" val="1514619152"/>
+      </p:ext>
+    </p:extLst>
+  </p:cSld>
+  <p:clrMapOvr>
+    <a:masterClrMapping/>
+  </p:clrMapOvr>
+  <p:timing>
+    <p:tnLst>
+      <p:par>
+        <p:cTn id="1" dur="indefinite" restart="never" nodeType="tmRoot"/>
+      </p:par>
+    </p:tnLst>
+  </p:timing>
+</p:sld>
+</file>
+
+<file path=ppt/slides/slide8.xml><?xml version="1.0" encoding="utf-8"?>
+<p:sld xmlns:a="http://schemas.openxmlformats.org/drawingml/2006/main" xmlns:r="http://schemas.openxmlformats.org/officeDocument/2006/relationships" xmlns:p="http://schemas.openxmlformats.org/presentationml/2006/main">
+  <p:cSld>
+    <p:spTree>
+      <p:nvGrpSpPr>
+        <p:cNvPr id="1" name=""/>
+        <p:cNvGrpSpPr/>
+        <p:nvPr/>
+      </p:nvGrpSpPr>
+      <p:grpSpPr>
+        <a:xfrm>
+          <a:off x="0" y="0"/>
+          <a:ext cx="0" cy="0"/>
+          <a:chOff x="0" y="0"/>
+          <a:chExt cx="0" cy="0"/>
+        </a:xfrm>
+      </p:grpSpPr>
+      <p:sp>
+        <p:nvSpPr>
+          <p:cNvPr id="6" name="object 2"/>
+          <p:cNvSpPr txBox="1">
+            <a:spLocks noGrp="1"/>
+          </p:cNvSpPr>
+          <p:nvPr>
+            <p:ph type="title"/>
+          </p:nvPr>
+        </p:nvSpPr>
+        <p:spPr>
+          <a:xfrm>
+            <a:off x="1310052" y="555751"/>
+            <a:ext cx="6826250" cy="602088"/>
+          </a:xfrm>
+          <a:prstGeom prst="rect">
+            <a:avLst/>
+          </a:prstGeom>
+        </p:spPr>
+        <p:txBody>
+          <a:bodyPr vert="horz" wrap="square" lIns="0" tIns="12065" rIns="0" bIns="0" rtlCol="0">
+            <a:spAutoFit/>
+          </a:bodyPr>
+          <a:lstStyle/>
+          <a:p>
+            <a:pPr marL="12700">
+              <a:lnSpc>
+                <a:spcPts val="4560"/>
+              </a:lnSpc>
+            </a:pPr>
+            <a:r>
+              <a:rPr lang="zh-TW" altLang="en-US" sz="4000" dirty="0"/>
+              <a:t>組員工作分配</a:t>
+            </a:r>
+            <a:endParaRPr sz="4000" dirty="0">
+              <a:uFillTx/>
+            </a:endParaRPr>
+          </a:p>
+        </p:txBody>
+      </p:sp>
+      <p:graphicFrame>
+        <p:nvGraphicFramePr>
+          <p:cNvPr id="8" name="表格 7"/>
+          <p:cNvGraphicFramePr>
+            <a:graphicFrameLocks noGrp="1"/>
+          </p:cNvGraphicFramePr>
+          <p:nvPr>
+            <p:extLst>
+              <p:ext uri="{D42A27DB-BD31-4B8C-83A1-F6EECF244321}">
+                <p14:modId xmlns:p14="http://schemas.microsoft.com/office/powerpoint/2010/main" val="1962468609"/>
+              </p:ext>
+            </p:extLst>
+          </p:nvPr>
+        </p:nvGraphicFramePr>
+        <p:xfrm>
+          <a:off x="1458268" y="2341265"/>
+          <a:ext cx="7128934" cy="741680"/>
+        </p:xfrm>
+        <a:graphic>
+          <a:graphicData uri="http://schemas.openxmlformats.org/drawingml/2006/table">
+            <a:tbl>
+              <a:tblPr firstRow="1" bandRow="1">
+                <a:tableStyleId>{5C22544A-7EE6-4342-B048-85BDC9FD1C3A}</a:tableStyleId>
+              </a:tblPr>
+              <a:tblGrid>
+                <a:gridCol w="3564467"/>
+                <a:gridCol w="3564467"/>
+              </a:tblGrid>
+              <a:tr h="370840">
+                <a:tc>
+                  <a:txBody>
+                    <a:bodyPr/>
+                    <a:lstStyle/>
+                    <a:p>
+                      <a:r>
+                        <a:rPr lang="zh-TW" altLang="en-US" dirty="0" smtClean="0"/>
+                        <a:t>組員</a:t>
+                      </a:r>
+                      <a:endParaRPr lang="zh-TW" altLang="en-US" dirty="0"/>
+                    </a:p>
+                  </a:txBody>
+                  <a:tcPr/>
+                </a:tc>
+                <a:tc>
+                  <a:txBody>
+                    <a:bodyPr/>
+                    <a:lstStyle/>
+                    <a:p>
+                      <a:r>
+                        <a:rPr lang="zh-TW" altLang="en-US" dirty="0" smtClean="0"/>
+                        <a:t>工作內容</a:t>
+                      </a:r>
+                      <a:endParaRPr lang="zh-TW" altLang="en-US" dirty="0"/>
+                    </a:p>
+                  </a:txBody>
+                  <a:tcPr/>
+                </a:tc>
+              </a:tr>
+              <a:tr h="370840">
+                <a:tc>
+                  <a:txBody>
+                    <a:bodyPr/>
+                    <a:lstStyle/>
+                    <a:p>
+                      <a:r>
+                        <a:rPr lang="zh-TW" altLang="en-US" dirty="0" smtClean="0"/>
+                        <a:t>劉宸宗</a:t>
+                      </a:r>
+                      <a:endParaRPr lang="zh-TW" altLang="en-US" dirty="0"/>
+                    </a:p>
+                  </a:txBody>
+                  <a:tcPr/>
+                </a:tc>
+                <a:tc>
+                  <a:txBody>
+                    <a:bodyPr/>
+                    <a:lstStyle/>
+                    <a:p>
+                      <a:r>
+                        <a:rPr lang="zh-TW" altLang="en-US" dirty="0" smtClean="0"/>
+                        <a:t>專案實作、報告製作、口頭報告</a:t>
+                      </a:r>
+                      <a:endParaRPr lang="zh-TW" altLang="en-US" dirty="0"/>
+                    </a:p>
+                  </a:txBody>
+                  <a:tcPr/>
+                </a:tc>
+              </a:tr>
+            </a:tbl>
+          </a:graphicData>
+        </a:graphic>
+      </p:graphicFrame>
+    </p:spTree>
+    <p:extLst>
+      <p:ext uri="{BB962C8B-B14F-4D97-AF65-F5344CB8AC3E}">
+        <p14:creationId xmlns:p14="http://schemas.microsoft.com/office/powerpoint/2010/main" val="1881983704"/>
+      </p:ext>
+    </p:extLst>
+  </p:cSld>
+  <p:clrMapOvr>
+    <a:masterClrMapping/>
+  </p:clrMapOvr>
+  <p:timing>
+    <p:tnLst>
+      <p:par>
+        <p:cTn id="1" dur="indefinite" restart="never" nodeType="tmRoot"/>
+      </p:par>
+    </p:tnLst>
+  </p:timing>
+</p:sld>
+</file>
+
+<file path=ppt/slides/slide9.xml><?xml version="1.0" encoding="utf-8"?>
 <p:sld xmlns:a="http://schemas.openxmlformats.org/drawingml/2006/main" xmlns:r="http://schemas.openxmlformats.org/officeDocument/2006/relationships" xmlns:p="http://schemas.openxmlformats.org/presentationml/2006/main">
   <p:cSld>
     <p:spTree>

</xml_diff>